<commit_message>
Must have updated the flow-chart...
</commit_message>
<xml_diff>
--- a/figure-creation/flow-chart.pptx
+++ b/figure-creation/flow-chart.pptx
@@ -3431,7 +3431,7 @@
               <a:extLst>
                 <a:ext uri="{BEBA8EAE-BF5A-486C-A8C5-ECC9F3942E4B}">
                   <a14:imgProps xmlns:a14="http://schemas.microsoft.com/office/drawing/2010/main">
-                    <a14:imgLayer r:embed="rId6">
+                    <a14:imgLayer r:embed="rId5">
                       <a14:imgEffect>
                         <a14:backgroundRemoval t="13274" b="100000" l="0" r="100000">
                           <a14:foregroundMark x1="2188" y1="25664" x2="2188" y2="25664"/>
@@ -3474,7 +3474,7 @@
               <a:extLst>
                 <a:ext uri="{BEBA8EAE-BF5A-486C-A8C5-ECC9F3942E4B}">
                   <a14:imgProps xmlns:a14="http://schemas.microsoft.com/office/drawing/2010/main">
-                    <a14:imgLayer r:embed="rId7">
+                    <a14:imgLayer r:embed="rId5">
                       <a14:imgEffect>
                         <a14:backgroundRemoval t="13274" b="100000" l="0" r="100000">
                           <a14:foregroundMark x1="2188" y1="25664" x2="2188" y2="25664"/>
@@ -3517,7 +3517,7 @@
               <a:extLst>
                 <a:ext uri="{BEBA8EAE-BF5A-486C-A8C5-ECC9F3942E4B}">
                   <a14:imgProps xmlns:a14="http://schemas.microsoft.com/office/drawing/2010/main">
-                    <a14:imgLayer r:embed="rId8">
+                    <a14:imgLayer r:embed="rId5">
                       <a14:imgEffect>
                         <a14:backgroundRemoval t="13274" b="100000" l="0" r="100000">
                           <a14:foregroundMark x1="2188" y1="25664" x2="2188" y2="25664"/>
@@ -3560,7 +3560,7 @@
               <a:extLst>
                 <a:ext uri="{BEBA8EAE-BF5A-486C-A8C5-ECC9F3942E4B}">
                   <a14:imgProps xmlns:a14="http://schemas.microsoft.com/office/drawing/2010/main">
-                    <a14:imgLayer r:embed="rId5">
+                    <a14:imgLayer r:embed="rId4">
                       <a14:imgEffect>
                         <a14:backgroundRemoval t="13274" b="100000" l="0" r="100000">
                           <a14:foregroundMark x1="2188" y1="25664" x2="2188" y2="25664"/>
@@ -3603,7 +3603,7 @@
               <a:extLst>
                 <a:ext uri="{BEBA8EAE-BF5A-486C-A8C5-ECC9F3942E4B}">
                   <a14:imgProps xmlns:a14="http://schemas.microsoft.com/office/drawing/2010/main">
-                    <a14:imgLayer r:embed="rId7">
+                    <a14:imgLayer r:embed="rId5">
                       <a14:imgEffect>
                         <a14:backgroundRemoval t="13274" b="100000" l="0" r="100000">
                           <a14:foregroundMark x1="2188" y1="25664" x2="2188" y2="25664"/>
@@ -4178,7 +4178,7 @@
           <p:nvPr/>
         </p:nvPicPr>
         <p:blipFill>
-          <a:blip r:embed="rId9"/>
+          <a:blip r:embed="rId6"/>
           <a:stretch>
             <a:fillRect/>
           </a:stretch>
@@ -4202,7 +4202,7 @@
           <p:nvPr/>
         </p:nvPicPr>
         <p:blipFill>
-          <a:blip r:embed="rId9"/>
+          <a:blip r:embed="rId6"/>
           <a:stretch>
             <a:fillRect/>
           </a:stretch>
@@ -4226,7 +4226,7 @@
           <p:nvPr/>
         </p:nvPicPr>
         <p:blipFill>
-          <a:blip r:embed="rId9"/>
+          <a:blip r:embed="rId6"/>
           <a:stretch>
             <a:fillRect/>
           </a:stretch>
@@ -4250,7 +4250,7 @@
           <p:nvPr/>
         </p:nvPicPr>
         <p:blipFill>
-          <a:blip r:embed="rId9"/>
+          <a:blip r:embed="rId6"/>
           <a:stretch>
             <a:fillRect/>
           </a:stretch>
@@ -4689,7 +4689,7 @@
           <p:nvPr/>
         </p:nvPicPr>
         <p:blipFill>
-          <a:blip r:embed="rId10"/>
+          <a:blip r:embed="rId7"/>
           <a:stretch>
             <a:fillRect/>
           </a:stretch>
@@ -4973,7 +4973,7 @@
               <a:extLst>
                 <a:ext uri="{BEBA8EAE-BF5A-486C-A8C5-ECC9F3942E4B}">
                   <a14:imgProps xmlns:a14="http://schemas.microsoft.com/office/drawing/2010/main">
-                    <a14:imgLayer r:embed="rId7">
+                    <a14:imgLayer r:embed="rId8">
                       <a14:imgEffect>
                         <a14:backgroundRemoval t="13274" b="100000" l="0" r="100000">
                           <a14:foregroundMark x1="2188" y1="25664" x2="2188" y2="25664"/>
@@ -5016,7 +5016,7 @@
               <a:extLst>
                 <a:ext uri="{BEBA8EAE-BF5A-486C-A8C5-ECC9F3942E4B}">
                   <a14:imgProps xmlns:a14="http://schemas.microsoft.com/office/drawing/2010/main">
-                    <a14:imgLayer r:embed="rId6">
+                    <a14:imgLayer r:embed="rId3">
                       <a14:imgEffect>
                         <a14:backgroundRemoval t="13274" b="100000" l="0" r="100000">
                           <a14:foregroundMark x1="2188" y1="25664" x2="2188" y2="25664"/>
@@ -5059,7 +5059,7 @@
               <a:extLst>
                 <a:ext uri="{BEBA8EAE-BF5A-486C-A8C5-ECC9F3942E4B}">
                   <a14:imgProps xmlns:a14="http://schemas.microsoft.com/office/drawing/2010/main">
-                    <a14:imgLayer r:embed="rId6">
+                    <a14:imgLayer r:embed="rId5">
                       <a14:imgEffect>
                         <a14:backgroundRemoval t="13274" b="100000" l="0" r="100000">
                           <a14:foregroundMark x1="2188" y1="25664" x2="2188" y2="25664"/>
@@ -5102,7 +5102,7 @@
               <a:extLst>
                 <a:ext uri="{BEBA8EAE-BF5A-486C-A8C5-ECC9F3942E4B}">
                   <a14:imgProps xmlns:a14="http://schemas.microsoft.com/office/drawing/2010/main">
-                    <a14:imgLayer r:embed="rId7">
+                    <a14:imgLayer r:embed="rId5">
                       <a14:imgEffect>
                         <a14:backgroundRemoval t="13274" b="100000" l="0" r="100000">
                           <a14:foregroundMark x1="2188" y1="25664" x2="2188" y2="25664"/>
@@ -5145,7 +5145,7 @@
               <a:extLst>
                 <a:ext uri="{BEBA8EAE-BF5A-486C-A8C5-ECC9F3942E4B}">
                   <a14:imgProps xmlns:a14="http://schemas.microsoft.com/office/drawing/2010/main">
-                    <a14:imgLayer r:embed="rId7">
+                    <a14:imgLayer r:embed="rId3">
                       <a14:imgEffect>
                         <a14:backgroundRemoval t="13274" b="100000" l="0" r="100000">
                           <a14:foregroundMark x1="2188" y1="25664" x2="2188" y2="25664"/>
@@ -5188,7 +5188,7 @@
               <a:extLst>
                 <a:ext uri="{BEBA8EAE-BF5A-486C-A8C5-ECC9F3942E4B}">
                   <a14:imgProps xmlns:a14="http://schemas.microsoft.com/office/drawing/2010/main">
-                    <a14:imgLayer r:embed="rId7">
+                    <a14:imgLayer r:embed="rId3">
                       <a14:imgEffect>
                         <a14:backgroundRemoval t="13274" b="100000" l="0" r="100000">
                           <a14:foregroundMark x1="2188" y1="25664" x2="2188" y2="25664"/>
@@ -5231,7 +5231,7 @@
               <a:extLst>
                 <a:ext uri="{BEBA8EAE-BF5A-486C-A8C5-ECC9F3942E4B}">
                   <a14:imgProps xmlns:a14="http://schemas.microsoft.com/office/drawing/2010/main">
-                    <a14:imgLayer r:embed="rId7">
+                    <a14:imgLayer r:embed="rId5">
                       <a14:imgEffect>
                         <a14:backgroundRemoval t="13274" b="100000" l="0" r="100000">
                           <a14:foregroundMark x1="2188" y1="25664" x2="2188" y2="25664"/>
@@ -5274,7 +5274,7 @@
               <a:extLst>
                 <a:ext uri="{BEBA8EAE-BF5A-486C-A8C5-ECC9F3942E4B}">
                   <a14:imgProps xmlns:a14="http://schemas.microsoft.com/office/drawing/2010/main">
-                    <a14:imgLayer r:embed="rId11">
+                    <a14:imgLayer r:embed="rId5">
                       <a14:imgEffect>
                         <a14:backgroundRemoval t="13274" b="100000" l="0" r="100000">
                           <a14:foregroundMark x1="2188" y1="25664" x2="2188" y2="25664"/>
@@ -5317,7 +5317,7 @@
               <a:extLst>
                 <a:ext uri="{BEBA8EAE-BF5A-486C-A8C5-ECC9F3942E4B}">
                   <a14:imgProps xmlns:a14="http://schemas.microsoft.com/office/drawing/2010/main">
-                    <a14:imgLayer r:embed="rId7">
+                    <a14:imgLayer r:embed="rId5">
                       <a14:imgEffect>
                         <a14:backgroundRemoval t="13274" b="100000" l="0" r="100000">
                           <a14:foregroundMark x1="2188" y1="25664" x2="2188" y2="25664"/>
@@ -5360,7 +5360,7 @@
               <a:extLst>
                 <a:ext uri="{BEBA8EAE-BF5A-486C-A8C5-ECC9F3942E4B}">
                   <a14:imgProps xmlns:a14="http://schemas.microsoft.com/office/drawing/2010/main">
-                    <a14:imgLayer r:embed="rId7">
+                    <a14:imgLayer r:embed="rId5">
                       <a14:imgEffect>
                         <a14:backgroundRemoval t="13274" b="100000" l="0" r="100000">
                           <a14:foregroundMark x1="2188" y1="25664" x2="2188" y2="25664"/>
@@ -5403,7 +5403,7 @@
               <a:extLst>
                 <a:ext uri="{BEBA8EAE-BF5A-486C-A8C5-ECC9F3942E4B}">
                   <a14:imgProps xmlns:a14="http://schemas.microsoft.com/office/drawing/2010/main">
-                    <a14:imgLayer r:embed="rId7">
+                    <a14:imgLayer r:embed="rId5">
                       <a14:imgEffect>
                         <a14:backgroundRemoval t="13274" b="100000" l="0" r="100000">
                           <a14:foregroundMark x1="2188" y1="25664" x2="2188" y2="25664"/>
@@ -5446,7 +5446,7 @@
               <a:extLst>
                 <a:ext uri="{BEBA8EAE-BF5A-486C-A8C5-ECC9F3942E4B}">
                   <a14:imgProps xmlns:a14="http://schemas.microsoft.com/office/drawing/2010/main">
-                    <a14:imgLayer r:embed="rId12">
+                    <a14:imgLayer r:embed="rId4">
                       <a14:imgEffect>
                         <a14:backgroundRemoval t="13274" b="100000" l="0" r="100000">
                           <a14:foregroundMark x1="2188" y1="25664" x2="2188" y2="25664"/>
@@ -5489,7 +5489,7 @@
               <a:extLst>
                 <a:ext uri="{BEBA8EAE-BF5A-486C-A8C5-ECC9F3942E4B}">
                   <a14:imgProps xmlns:a14="http://schemas.microsoft.com/office/drawing/2010/main">
-                    <a14:imgLayer r:embed="rId5">
+                    <a14:imgLayer r:embed="rId3">
                       <a14:imgEffect>
                         <a14:backgroundRemoval t="13274" b="100000" l="0" r="100000">
                           <a14:foregroundMark x1="2188" y1="25664" x2="2188" y2="25664"/>
@@ -5532,7 +5532,7 @@
               <a:extLst>
                 <a:ext uri="{BEBA8EAE-BF5A-486C-A8C5-ECC9F3942E4B}">
                   <a14:imgProps xmlns:a14="http://schemas.microsoft.com/office/drawing/2010/main">
-                    <a14:imgLayer r:embed="rId7">
+                    <a14:imgLayer r:embed="rId5">
                       <a14:imgEffect>
                         <a14:backgroundRemoval t="13274" b="100000" l="0" r="100000">
                           <a14:foregroundMark x1="2188" y1="25664" x2="2188" y2="25664"/>
@@ -5576,7 +5576,7 @@
             <a:extLst>
               <a:ext uri="{BEBA8EAE-BF5A-486C-A8C5-ECC9F3942E4B}">
                 <a14:imgProps xmlns:a14="http://schemas.microsoft.com/office/drawing/2010/main">
-                  <a14:imgLayer r:embed="rId7">
+                  <a14:imgLayer r:embed="rId5">
                     <a14:imgEffect>
                       <a14:backgroundRemoval t="13274" b="100000" l="0" r="100000">
                         <a14:foregroundMark x1="2188" y1="25664" x2="2188" y2="25664"/>
@@ -5619,7 +5619,7 @@
             <a:extLst>
               <a:ext uri="{BEBA8EAE-BF5A-486C-A8C5-ECC9F3942E4B}">
                 <a14:imgProps xmlns:a14="http://schemas.microsoft.com/office/drawing/2010/main">
-                  <a14:imgLayer r:embed="rId7">
+                  <a14:imgLayer r:embed="rId4">
                     <a14:imgEffect>
                       <a14:backgroundRemoval t="13274" b="100000" l="0" r="100000">
                         <a14:foregroundMark x1="2188" y1="25664" x2="2188" y2="25664"/>
@@ -5676,7 +5676,7 @@
               <a:extLst>
                 <a:ext uri="{BEBA8EAE-BF5A-486C-A8C5-ECC9F3942E4B}">
                   <a14:imgProps xmlns:a14="http://schemas.microsoft.com/office/drawing/2010/main">
-                    <a14:imgLayer r:embed="rId7">
+                    <a14:imgLayer r:embed="rId3">
                       <a14:imgEffect>
                         <a14:backgroundRemoval t="13274" b="100000" l="0" r="100000">
                           <a14:foregroundMark x1="2188" y1="25664" x2="2188" y2="25664"/>
@@ -5719,7 +5719,7 @@
               <a:extLst>
                 <a:ext uri="{BEBA8EAE-BF5A-486C-A8C5-ECC9F3942E4B}">
                   <a14:imgProps xmlns:a14="http://schemas.microsoft.com/office/drawing/2010/main">
-                    <a14:imgLayer r:embed="rId7">
+                    <a14:imgLayer r:embed="rId9">
                       <a14:imgEffect>
                         <a14:backgroundRemoval t="13274" b="100000" l="0" r="100000">
                           <a14:foregroundMark x1="2188" y1="25664" x2="2188" y2="25664"/>
@@ -5762,7 +5762,7 @@
               <a:extLst>
                 <a:ext uri="{BEBA8EAE-BF5A-486C-A8C5-ECC9F3942E4B}">
                   <a14:imgProps xmlns:a14="http://schemas.microsoft.com/office/drawing/2010/main">
-                    <a14:imgLayer r:embed="rId8">
+                    <a14:imgLayer r:embed="rId4">
                       <a14:imgEffect>
                         <a14:backgroundRemoval t="13274" b="100000" l="0" r="100000">
                           <a14:foregroundMark x1="2188" y1="25664" x2="2188" y2="25664"/>
@@ -5805,7 +5805,7 @@
               <a:extLst>
                 <a:ext uri="{BEBA8EAE-BF5A-486C-A8C5-ECC9F3942E4B}">
                   <a14:imgProps xmlns:a14="http://schemas.microsoft.com/office/drawing/2010/main">
-                    <a14:imgLayer r:embed="rId7">
+                    <a14:imgLayer r:embed="rId5">
                       <a14:imgEffect>
                         <a14:backgroundRemoval t="13274" b="100000" l="0" r="100000">
                           <a14:foregroundMark x1="2188" y1="25664" x2="2188" y2="25664"/>
@@ -5848,7 +5848,7 @@
               <a:extLst>
                 <a:ext uri="{BEBA8EAE-BF5A-486C-A8C5-ECC9F3942E4B}">
                   <a14:imgProps xmlns:a14="http://schemas.microsoft.com/office/drawing/2010/main">
-                    <a14:imgLayer r:embed="rId7">
+                    <a14:imgLayer r:embed="rId5">
                       <a14:imgEffect>
                         <a14:backgroundRemoval t="13274" b="100000" l="0" r="100000">
                           <a14:foregroundMark x1="2188" y1="25664" x2="2188" y2="25664"/>
@@ -5891,7 +5891,7 @@
               <a:extLst>
                 <a:ext uri="{BEBA8EAE-BF5A-486C-A8C5-ECC9F3942E4B}">
                   <a14:imgProps xmlns:a14="http://schemas.microsoft.com/office/drawing/2010/main">
-                    <a14:imgLayer r:embed="rId7">
+                    <a14:imgLayer r:embed="rId4">
                       <a14:imgEffect>
                         <a14:backgroundRemoval t="13274" b="100000" l="0" r="100000">
                           <a14:foregroundMark x1="2188" y1="25664" x2="2188" y2="25664"/>
@@ -5934,7 +5934,7 @@
               <a:extLst>
                 <a:ext uri="{BEBA8EAE-BF5A-486C-A8C5-ECC9F3942E4B}">
                   <a14:imgProps xmlns:a14="http://schemas.microsoft.com/office/drawing/2010/main">
-                    <a14:imgLayer r:embed="rId7">
+                    <a14:imgLayer r:embed="rId5">
                       <a14:imgEffect>
                         <a14:backgroundRemoval t="13274" b="100000" l="0" r="100000">
                           <a14:foregroundMark x1="2188" y1="25664" x2="2188" y2="25664"/>
@@ -5977,7 +5977,7 @@
               <a:extLst>
                 <a:ext uri="{BEBA8EAE-BF5A-486C-A8C5-ECC9F3942E4B}">
                   <a14:imgProps xmlns:a14="http://schemas.microsoft.com/office/drawing/2010/main">
-                    <a14:imgLayer r:embed="rId7">
+                    <a14:imgLayer r:embed="rId5">
                       <a14:imgEffect>
                         <a14:backgroundRemoval t="13274" b="100000" l="0" r="100000">
                           <a14:foregroundMark x1="2188" y1="25664" x2="2188" y2="25664"/>
@@ -6020,7 +6020,7 @@
               <a:extLst>
                 <a:ext uri="{BEBA8EAE-BF5A-486C-A8C5-ECC9F3942E4B}">
                   <a14:imgProps xmlns:a14="http://schemas.microsoft.com/office/drawing/2010/main">
-                    <a14:imgLayer r:embed="rId7">
+                    <a14:imgLayer r:embed="rId5">
                       <a14:imgEffect>
                         <a14:backgroundRemoval t="13274" b="100000" l="0" r="100000">
                           <a14:foregroundMark x1="2188" y1="25664" x2="2188" y2="25664"/>
@@ -6063,7 +6063,7 @@
               <a:extLst>
                 <a:ext uri="{BEBA8EAE-BF5A-486C-A8C5-ECC9F3942E4B}">
                   <a14:imgProps xmlns:a14="http://schemas.microsoft.com/office/drawing/2010/main">
-                    <a14:imgLayer r:embed="rId7">
+                    <a14:imgLayer r:embed="rId5">
                       <a14:imgEffect>
                         <a14:backgroundRemoval t="13274" b="100000" l="0" r="100000">
                           <a14:foregroundMark x1="2188" y1="25664" x2="2188" y2="25664"/>
@@ -6106,7 +6106,7 @@
               <a:extLst>
                 <a:ext uri="{BEBA8EAE-BF5A-486C-A8C5-ECC9F3942E4B}">
                   <a14:imgProps xmlns:a14="http://schemas.microsoft.com/office/drawing/2010/main">
-                    <a14:imgLayer r:embed="rId7">
+                    <a14:imgLayer r:embed="rId4">
                       <a14:imgEffect>
                         <a14:backgroundRemoval t="13274" b="100000" l="0" r="100000">
                           <a14:foregroundMark x1="2188" y1="25664" x2="2188" y2="25664"/>
@@ -6149,7 +6149,7 @@
               <a:extLst>
                 <a:ext uri="{BEBA8EAE-BF5A-486C-A8C5-ECC9F3942E4B}">
                   <a14:imgProps xmlns:a14="http://schemas.microsoft.com/office/drawing/2010/main">
-                    <a14:imgLayer r:embed="rId7">
+                    <a14:imgLayer r:embed="rId4">
                       <a14:imgEffect>
                         <a14:backgroundRemoval t="13274" b="100000" l="0" r="100000">
                           <a14:foregroundMark x1="2188" y1="25664" x2="2188" y2="25664"/>
@@ -6192,7 +6192,7 @@
               <a:extLst>
                 <a:ext uri="{BEBA8EAE-BF5A-486C-A8C5-ECC9F3942E4B}">
                   <a14:imgProps xmlns:a14="http://schemas.microsoft.com/office/drawing/2010/main">
-                    <a14:imgLayer r:embed="rId7">
+                    <a14:imgLayer r:embed="rId4">
                       <a14:imgEffect>
                         <a14:backgroundRemoval t="13274" b="100000" l="0" r="100000">
                           <a14:foregroundMark x1="2188" y1="25664" x2="2188" y2="25664"/>
@@ -6235,7 +6235,7 @@
               <a:extLst>
                 <a:ext uri="{BEBA8EAE-BF5A-486C-A8C5-ECC9F3942E4B}">
                   <a14:imgProps xmlns:a14="http://schemas.microsoft.com/office/drawing/2010/main">
-                    <a14:imgLayer r:embed="rId7">
+                    <a14:imgLayer r:embed="rId5">
                       <a14:imgEffect>
                         <a14:backgroundRemoval t="13274" b="100000" l="0" r="100000">
                           <a14:foregroundMark x1="2188" y1="25664" x2="2188" y2="25664"/>
@@ -6349,7 +6349,7 @@
           <p:nvPr/>
         </p:nvPicPr>
         <p:blipFill>
-          <a:blip r:embed="rId9"/>
+          <a:blip r:embed="rId6"/>
           <a:stretch>
             <a:fillRect/>
           </a:stretch>
@@ -6450,7 +6450,7 @@
           <p:nvPr/>
         </p:nvPicPr>
         <p:blipFill>
-          <a:blip r:embed="rId10"/>
+          <a:blip r:embed="rId7"/>
           <a:stretch>
             <a:fillRect/>
           </a:stretch>
@@ -6552,7 +6552,7 @@
           <p:nvPr/>
         </p:nvPicPr>
         <p:blipFill>
-          <a:blip r:embed="rId13"/>
+          <a:blip r:embed="rId10"/>
           <a:stretch>
             <a:fillRect/>
           </a:stretch>
@@ -6576,7 +6576,7 @@
           <p:nvPr/>
         </p:nvPicPr>
         <p:blipFill>
-          <a:blip r:embed="rId13"/>
+          <a:blip r:embed="rId10"/>
           <a:stretch>
             <a:fillRect/>
           </a:stretch>

</xml_diff>

<commit_message>
Edits to flow chart figure.
</commit_message>
<xml_diff>
--- a/figure-creation/flow-chart.pptx
+++ b/figure-creation/flow-chart.pptx
@@ -288,7 +288,7 @@
           <a:p>
             <a:fld id="{E0B9A32A-63C0-7E4E-9A03-467F0A43F658}" type="datetimeFigureOut">
               <a:rPr lang="en-US" smtClean="0"/>
-              <a:t>12/5/16</a:t>
+              <a:t>12/7/16</a:t>
             </a:fld>
             <a:endParaRPr lang="en-US"/>
           </a:p>
@@ -458,7 +458,7 @@
           <a:p>
             <a:fld id="{E0B9A32A-63C0-7E4E-9A03-467F0A43F658}" type="datetimeFigureOut">
               <a:rPr lang="en-US" smtClean="0"/>
-              <a:t>12/5/16</a:t>
+              <a:t>12/7/16</a:t>
             </a:fld>
             <a:endParaRPr lang="en-US"/>
           </a:p>
@@ -638,7 +638,7 @@
           <a:p>
             <a:fld id="{E0B9A32A-63C0-7E4E-9A03-467F0A43F658}" type="datetimeFigureOut">
               <a:rPr lang="en-US" smtClean="0"/>
-              <a:t>12/5/16</a:t>
+              <a:t>12/7/16</a:t>
             </a:fld>
             <a:endParaRPr lang="en-US"/>
           </a:p>
@@ -808,7 +808,7 @@
           <a:p>
             <a:fld id="{E0B9A32A-63C0-7E4E-9A03-467F0A43F658}" type="datetimeFigureOut">
               <a:rPr lang="en-US" smtClean="0"/>
-              <a:t>12/5/16</a:t>
+              <a:t>12/7/16</a:t>
             </a:fld>
             <a:endParaRPr lang="en-US"/>
           </a:p>
@@ -1054,7 +1054,7 @@
           <a:p>
             <a:fld id="{E0B9A32A-63C0-7E4E-9A03-467F0A43F658}" type="datetimeFigureOut">
               <a:rPr lang="en-US" smtClean="0"/>
-              <a:t>12/5/16</a:t>
+              <a:t>12/7/16</a:t>
             </a:fld>
             <a:endParaRPr lang="en-US"/>
           </a:p>
@@ -1342,7 +1342,7 @@
           <a:p>
             <a:fld id="{E0B9A32A-63C0-7E4E-9A03-467F0A43F658}" type="datetimeFigureOut">
               <a:rPr lang="en-US" smtClean="0"/>
-              <a:t>12/5/16</a:t>
+              <a:t>12/7/16</a:t>
             </a:fld>
             <a:endParaRPr lang="en-US"/>
           </a:p>
@@ -1764,7 +1764,7 @@
           <a:p>
             <a:fld id="{E0B9A32A-63C0-7E4E-9A03-467F0A43F658}" type="datetimeFigureOut">
               <a:rPr lang="en-US" smtClean="0"/>
-              <a:t>12/5/16</a:t>
+              <a:t>12/7/16</a:t>
             </a:fld>
             <a:endParaRPr lang="en-US"/>
           </a:p>
@@ -1882,7 +1882,7 @@
           <a:p>
             <a:fld id="{E0B9A32A-63C0-7E4E-9A03-467F0A43F658}" type="datetimeFigureOut">
               <a:rPr lang="en-US" smtClean="0"/>
-              <a:t>12/5/16</a:t>
+              <a:t>12/7/16</a:t>
             </a:fld>
             <a:endParaRPr lang="en-US"/>
           </a:p>
@@ -1977,7 +1977,7 @@
           <a:p>
             <a:fld id="{E0B9A32A-63C0-7E4E-9A03-467F0A43F658}" type="datetimeFigureOut">
               <a:rPr lang="en-US" smtClean="0"/>
-              <a:t>12/5/16</a:t>
+              <a:t>12/7/16</a:t>
             </a:fld>
             <a:endParaRPr lang="en-US"/>
           </a:p>
@@ -2254,7 +2254,7 @@
           <a:p>
             <a:fld id="{E0B9A32A-63C0-7E4E-9A03-467F0A43F658}" type="datetimeFigureOut">
               <a:rPr lang="en-US" smtClean="0"/>
-              <a:t>12/5/16</a:t>
+              <a:t>12/7/16</a:t>
             </a:fld>
             <a:endParaRPr lang="en-US"/>
           </a:p>
@@ -2507,7 +2507,7 @@
           <a:p>
             <a:fld id="{E0B9A32A-63C0-7E4E-9A03-467F0A43F658}" type="datetimeFigureOut">
               <a:rPr lang="en-US" smtClean="0"/>
-              <a:t>12/5/16</a:t>
+              <a:t>12/7/16</a:t>
             </a:fld>
             <a:endParaRPr lang="en-US"/>
           </a:p>
@@ -2720,7 +2720,7 @@
           <a:p>
             <a:fld id="{E0B9A32A-63C0-7E4E-9A03-467F0A43F658}" type="datetimeFigureOut">
               <a:rPr lang="en-US" smtClean="0"/>
-              <a:t>12/5/16</a:t>
+              <a:t>12/7/16</a:t>
             </a:fld>
             <a:endParaRPr lang="en-US"/>
           </a:p>
@@ -3811,8 +3811,8 @@
         </p:nvSpPr>
         <p:spPr>
           <a:xfrm>
-            <a:off x="3038113" y="540672"/>
-            <a:ext cx="1582717" cy="1028718"/>
+            <a:off x="3026568" y="540672"/>
+            <a:ext cx="1544445" cy="1028718"/>
           </a:xfrm>
           <a:prstGeom prst="rect">
             <a:avLst/>
@@ -3839,17 +3839,11 @@
           <a:p>
             <a:r>
               <a:rPr lang="en-US" sz="1600" dirty="0" smtClean="0"/>
-              <a:t>1,118 SNPs were  fixed amongst the samples for </a:t>
-            </a:r>
-          </a:p>
-          <a:p>
+              <a:t>1,118 SNPs were  fixed </a:t>
+            </a:r>
             <a:r>
               <a:rPr lang="en-US" sz="1600" dirty="0"/>
-              <a:t>a</a:t>
-            </a:r>
-            <a:r>
-              <a:rPr lang="en-US" sz="1600" dirty="0" smtClean="0"/>
-              <a:t>lternate alleles</a:t>
+              <a:t>for alternate alleles between the samples from the two rivers.</a:t>
             </a:r>
             <a:endParaRPr lang="en-US" sz="1600" dirty="0"/>
           </a:p>
@@ -4155,7 +4149,15 @@
           <a:p>
             <a:r>
               <a:rPr lang="en-US" sz="1600" dirty="0" smtClean="0"/>
-              <a:t>96 SNPs on 4 </a:t>
+              <a:t>96 SNPs </a:t>
+            </a:r>
+            <a:r>
+              <a:rPr lang="en-US" sz="1600" smtClean="0"/>
+              <a:t>on </a:t>
+            </a:r>
+            <a:r>
+              <a:rPr lang="en-US" sz="1600" smtClean="0"/>
+              <a:t>four </a:t>
             </a:r>
             <a:r>
               <a:rPr lang="en-US" sz="1600" dirty="0" err="1" smtClean="0"/>
@@ -4938,7 +4940,6 @@
               <a:rPr lang="en-US" sz="1700" dirty="0" smtClean="0"/>
               <a:t>ON SUBSEQUENT CHIPS</a:t>
             </a:r>
-            <a:endParaRPr lang="en-US" sz="1700" dirty="0" smtClean="0"/>
           </a:p>
           <a:p>
             <a:pPr algn="ctr"/>

</xml_diff>